<commit_message>
sample updated for testing.
</commit_message>
<xml_diff>
--- a/samples/pptx/sample.pptx
+++ b/samples/pptx/sample.pptx
@@ -3349,12 +3349,6 @@
             <a:fillRect/>
           </a:stretch>
         </p:blipFill>
-        <p:spPr>
-          <a:xfrm>
-            <a:off x="3124200" y="3356451"/>
-            <a:ext cx="2895600" cy="1013460"/>
-          </a:xfrm>
-        </p:spPr>
       </p:pic>
     </p:spTree>
     <p:extLst>
@@ -3431,12 +3425,6 @@
             <a:fillRect/>
           </a:stretch>
         </p:blipFill>
-        <p:spPr>
-          <a:xfrm>
-            <a:off x="3124200" y="3356451"/>
-            <a:ext cx="2895600" cy="1013460"/>
-          </a:xfrm>
-        </p:spPr>
       </p:pic>
     </p:spTree>
     <p:extLst>
@@ -3513,12 +3501,6 @@
             <a:fillRect/>
           </a:stretch>
         </p:blipFill>
-        <p:spPr>
-          <a:xfrm>
-            <a:off x="3124200" y="3356451"/>
-            <a:ext cx="2895600" cy="1013460"/>
-          </a:xfrm>
-        </p:spPr>
       </p:pic>
     </p:spTree>
     <p:extLst>
@@ -3595,12 +3577,6 @@
             <a:fillRect/>
           </a:stretch>
         </p:blipFill>
-        <p:spPr>
-          <a:xfrm>
-            <a:off x="3124200" y="3356451"/>
-            <a:ext cx="2895600" cy="1013460"/>
-          </a:xfrm>
-        </p:spPr>
       </p:pic>
     </p:spTree>
     <p:extLst>

</xml_diff>

<commit_message>
New functionality added that lets passing of coordinates for images in a pictorial slide.
</commit_message>
<xml_diff>
--- a/samples/pptx/sample.pptx
+++ b/samples/pptx/sample.pptx
@@ -3501,6 +3501,12 @@
             <a:fillRect/>
           </a:stretch>
         </p:blipFill>
+        <p:spPr>
+          <a:xfrm>
+            <a:off x="124200" y="3356451"/>
+            <a:ext cx="2895600" cy="1013460"/>
+          </a:xfrm>
+        </p:spPr>
       </p:pic>
     </p:spTree>
     <p:extLst>

</xml_diff>

<commit_message>
added new rspec sample pptx with table slide
</commit_message>
<xml_diff>
--- a/samples/pptx/sample.pptx
+++ b/samples/pptx/sample.pptx
@@ -13,6 +13,7 @@
     <p:sldId id="257" r:id="rId672"/>
     <p:sldId id="257" r:id="rId673"/>
     <p:sldId id="257" r:id="rId674"/>
+    <p:sldId id="257" r:id="rId675"/>
   </p:sldIdLst>
   <p:sldSz cx="9144000" cy="6858000" type="screen4x3"/>
   <p:notesSz cx="6858000" cy="9144000"/>
@@ -3669,6 +3670,181 @@
     <p:extLst>
       <p:ext uri="{BB962C8B-B14F-4D97-AF65-F5344CB8AC3E}">
         <p14:creationId xmlns:p14="http://schemas.microsoft.com/office/powerpoint/2010/main" val="4058324642"/>
+      </p:ext>
+    </p:extLst>
+  </p:cSld>
+  <p:clrMapOvr>
+    <a:masterClrMapping/>
+  </p:clrMapOvr>
+</p:sld>
+</file>
+
+<file path=ppt/slides/slide9.xml><?xml version="1.0" encoding="utf-8"?>
+<p:sld xmlns:p="http://schemas.openxmlformats.org/presentationml/2006/main" xmlns:a="http://schemas.openxmlformats.org/drawingml/2006/main" xmlns:r="http://schemas.openxmlformats.org/officeDocument/2006/relationships">
+  <p:cSld>
+    <p:spTree>
+      <p:nvGrpSpPr>
+        <p:cNvPr id="1" name=""/>
+        <p:cNvGrpSpPr/>
+        <p:nvPr/>
+      </p:nvGrpSpPr>
+      <p:grpSpPr>
+        <a:xfrm>
+          <a:off x="0" y="0"/>
+          <a:ext cx="0" cy="0"/>
+          <a:chOff x="0" y="0"/>
+          <a:chExt cx="0" cy="0"/>
+        </a:xfrm>
+      </p:grpSpPr>
+      <p:sp>
+        <p:nvSpPr>
+          <p:cNvPr id="2" name="Title 1"/>
+          <p:cNvSpPr>
+            <a:spLocks noGrp="1"/>
+          </p:cNvSpPr>
+          <p:nvPr>
+            <p:ph type="title"/>
+          </p:nvPr>
+        </p:nvSpPr>
+        <p:spPr/>
+        <p:txBody>
+          <a:bodyPr/>
+          <a:lstStyle/>
+          <a:p>
+            <a:r>
+              <a:rPr lang="en-US" dirty="0" smtClean="0"/>
+              <a:t>Table test</a:t>
+            </a:r>
+            <a:endParaRPr lang="en-US" dirty="0"/>
+          </a:p>
+        </p:txBody>
+      </p:sp>
+      <p:graphicFrame>
+        <p:nvGraphicFramePr>
+          <p:cNvPr id="4" name="Content Placeholder 3"/>
+          <p:cNvGraphicFramePr>
+            <a:graphicFrameLocks noGrp="1"/>
+          </p:cNvGraphicFramePr>
+          <p:nvPr>
+            <p:ph idx="1"/>
+            <p:extLst>
+              <p:ext uri="{D42A27DB-BD31-4B8C-83A1-F6EECF244321}">
+                <p14:modId xmlns:p14="http://schemas.microsoft.com/office/powerpoint/2010/main" val="2437754990"/>
+              </p:ext>
+            </p:extLst>
+          </p:nvPr>
+        </p:nvGraphicFramePr>
+        <p:xfrm>
+          <a:off x="457200" y="1600200"/>
+          <a:ext cx="8229600" cy="1010920"/>
+        </p:xfrm>
+        <a:graphic>
+          <a:graphicData uri="http://schemas.openxmlformats.org/drawingml/2006/table">
+            <a:tbl>
+              <a:tblPr firstRow="1" bandRow="">
+                <a:tableStyleId>{5C22544A-7EE6-4342-B048-85BDC9FD1C3A}</a:tableStyleId>
+              </a:tblPr>
+              <a:tblGrid>
+                <a:gridCol w="1645920"/>
+                <a:gridCol w="1645920"/>
+                <a:gridCol w="1645920"/>
+              </a:tblGrid>
+              <a:tr h="370840">
+                <a:tc>
+                  <a:txBody>
+                    <a:bodyPr/>
+                    <a:lstStyle/>
+                    <a:p>
+                      <a:r>
+                        <a:rPr lang="en-US" dirty="0" smtClean="0"/>
+                        <a:t>foo</a:t>
+                      </a:r>
+                      <a:endParaRPr lang="en-US" dirty="0"/>
+                    </a:p>
+                  </a:txBody>
+                  <a:tcPr/>
+                </a:tc>
+                <a:tc>
+                  <a:txBody>
+                    <a:bodyPr/>
+                    <a:lstStyle/>
+                    <a:p>
+                      <a:r>
+                        <a:rPr lang="en-US" dirty="0" smtClean="0"/>
+                        <a:t>bar</a:t>
+                      </a:r>
+                      <a:endParaRPr lang="en-US" dirty="0"/>
+                    </a:p>
+                  </a:txBody>
+                  <a:tcPr/>
+                </a:tc>
+                <a:tc>
+                  <a:txBody>
+                    <a:bodyPr/>
+                    <a:lstStyle/>
+                    <a:p>
+                      <a:r>
+                        <a:rPr lang="en-US" dirty="0" smtClean="0"/>
+                        <a:t>baz</a:t>
+                      </a:r>
+                      <a:endParaRPr lang="en-US" dirty="0"/>
+                    </a:p>
+                  </a:txBody>
+                  <a:tcPr/>
+                </a:tc>
+              </a:tr>
+              <a:tr h="370840">
+                <a:tc>
+                  <a:txBody>
+                    <a:bodyPr/>
+                    <a:lstStyle/>
+                    <a:p>
+                      <a:r>
+                        <a:rPr lang="en-US" dirty="0" smtClean="0"/>
+                        <a:t>1</a:t>
+                      </a:r>
+                      <a:endParaRPr lang="en-US" dirty="0"/>
+                    </a:p>
+                  </a:txBody>
+                  <a:tcPr/>
+                </a:tc>
+                <a:tc>
+                  <a:txBody>
+                    <a:bodyPr/>
+                    <a:lstStyle/>
+                    <a:p>
+                      <a:r>
+                        <a:rPr lang="en-US" dirty="0" smtClean="0"/>
+                        <a:t>2</a:t>
+                      </a:r>
+                      <a:endParaRPr lang="en-US" dirty="0"/>
+                    </a:p>
+                  </a:txBody>
+                  <a:tcPr/>
+                </a:tc>
+                <a:tc>
+                  <a:txBody>
+                    <a:bodyPr/>
+                    <a:lstStyle/>
+                    <a:p>
+                      <a:r>
+                        <a:rPr lang="en-US" dirty="0" smtClean="0"/>
+                        <a:t>3</a:t>
+                      </a:r>
+                      <a:endParaRPr lang="en-US" dirty="0"/>
+                    </a:p>
+                  </a:txBody>
+                  <a:tcPr/>
+                </a:tc>
+              </a:tr>
+            </a:tbl>
+          </a:graphicData>
+        </a:graphic>
+      </p:graphicFrame>
+    </p:spTree>
+    <p:extLst>
+      <p:ext uri="{BB962C8B-B14F-4D97-AF65-F5344CB8AC3E}">
+        <p14:creationId xmlns:p14="http://schemas.microsoft.com/office/powerpoint/2010/main" val="1958185002"/>
       </p:ext>
     </p:extLst>
   </p:cSld>

</xml_diff>

<commit_message>
update of readme and test spec
</commit_message>
<xml_diff>
--- a/samples/pptx/sample.pptx
+++ b/samples/pptx/sample.pptx
@@ -13,6 +13,9 @@
     <p:sldId id="257" r:id="rId672"/>
     <p:sldId id="257" r:id="rId673"/>
     <p:sldId id="257" r:id="rId674"/>
+    <p:sldId id="257" r:id="rId675"/>
+    <p:sldId id="257" r:id="rId676"/>
+    <p:sldId id="257" r:id="rId677"/>
   </p:sldIdLst>
   <p:sldSz cx="9144000" cy="6858000" type="screen4x3"/>
   <p:notesSz cx="6858000" cy="9144000"/>
@@ -3125,6 +3128,274 @@
 </p:sld>
 </file>
 
+<file path=ppt/slides/slide10.xml><?xml version="1.0" encoding="utf-8"?>
+<p:sld xmlns:a="http://schemas.openxmlformats.org/drawingml/2006/main" xmlns:r="http://schemas.openxmlformats.org/officeDocument/2006/relationships" xmlns:p="http://schemas.openxmlformats.org/presentationml/2006/main">
+  <p:cSld>
+    <p:spTree>
+      <p:nvGrpSpPr>
+        <p:cNvPr id="1" name=""/>
+        <p:cNvGrpSpPr/>
+        <p:nvPr/>
+      </p:nvGrpSpPr>
+      <p:grpSpPr>
+        <a:xfrm>
+          <a:off x="0" y="0"/>
+          <a:ext cx="0" cy="0"/>
+          <a:chOff x="0" y="0"/>
+          <a:chExt cx="0" cy="0"/>
+        </a:xfrm>
+      </p:grpSpPr>
+      <p:sp>
+        <p:nvSpPr>
+          <p:cNvPr id="2" name="Title 1"/>
+          <p:cNvSpPr>
+            <a:spLocks noGrp="1"/>
+          </p:cNvSpPr>
+          <p:nvPr>
+            <p:ph type="title"/>
+          </p:nvPr>
+        </p:nvSpPr>
+        <p:spPr/>
+        <p:txBody>
+          <a:bodyPr/>
+          <a:lstStyle/>
+          <a:p>
+            <a:r>
+              <a:rPr lang="en-US" dirty="0" smtClean="0"/>
+              <a:t>Pic with Hash</a:t>
+            </a:r>
+            <a:endParaRPr lang="en-US" dirty="0"/>
+          </a:p>
+        </p:txBody>
+      </p:sp>
+      <p:pic>
+        <p:nvPicPr>
+          <p:cNvPr id="4" name="Content Placeholder 3"/>
+          <p:cNvPicPr>
+            <a:picLocks noGrp="1" noChangeAspect="1"/>
+          </p:cNvPicPr>
+          <p:nvPr>
+            <p:ph idx="1"/>
+          </p:nvPr>
+        </p:nvPicPr>
+        <p:blipFill>
+          <a:blip r:embed="rId2">
+            <a:extLst>
+              <a:ext uri="{28A0092B-C50C-407E-A947-70E740481C1C}">
+                <a14:useLocalDpi xmlns:a14="http://schemas.microsoft.com/office/drawing/2010/main" val="0"/>
+              </a:ext>
+            </a:extLst>
+          </a:blip>
+          <a:stretch>
+            <a:fillRect/>
+          </a:stretch>
+        </p:blipFill>
+        <p:spPr>
+          <a:xfrm>
+            <a:off x="124200" y="2356451"/>
+            <a:ext cx="4000000" cy="4000000"/>
+          </a:xfrm>
+        </p:spPr>
+      </p:pic>
+      <p:sp>
+        <p:nvSpPr>
+          <p:cNvPr id="5" name="Content 1"/>
+          <p:cNvSpPr txBox="1"/>
+          <p:nvPr/>
+        </p:nvSpPr>
+        <p:spPr>
+          <a:xfrm>
+            <a:off x="4490000" y="2556451"/>
+            <a:ext cx="4500000" cy="3000000"/>
+          </a:xfrm>
+          <a:prstGeom prst="rect">
+            <a:avLst/>
+          </a:prstGeom>
+          <a:noFill/>
+        </p:spPr>
+        <p:txBody>
+          <a:bodyPr wrap="square" rtlCol="0">
+            <a:spAutoFit/>
+          </a:bodyPr>
+          <a:lstStyle/>
+          <a:p>
+            <a:r>
+              <a:rPr lang="en-US" b="1" dirty="0" smtClean="0"/>
+              <a:t>Blue:</a:t>
+            </a:r>
+            <a:r>
+              <a:rPr lang="en-US" dirty="0" smtClean="0"/>
+              <a:t> Left</a:t>
+            </a:r>
+            <a:endParaRPr lang="en-US" dirty="0"/>
+          </a:p>
+          <a:p>
+            <a:r>
+              <a:rPr lang="en-US" b="1" dirty="0" smtClean="0"/>
+              <a:t>Green:</a:t>
+            </a:r>
+            <a:r>
+              <a:rPr lang="en-US" dirty="0" smtClean="0"/>
+              <a:t> Right</a:t>
+            </a:r>
+            <a:endParaRPr lang="en-US" dirty="0"/>
+          </a:p>
+          <a:p>
+            <a:r>
+              <a:rPr lang="en-US" b="1" dirty="0" smtClean="0"/>
+              <a:t>Red:</a:t>
+            </a:r>
+            <a:r>
+              <a:rPr lang="en-US" dirty="0" smtClean="0"/>
+              <a:t> Front</a:t>
+            </a:r>
+            <a:endParaRPr lang="en-US" dirty="0"/>
+          </a:p>
+          <a:p>
+            <a:r>
+              <a:rPr lang="en-US" b="1" dirty="0" smtClean="0"/>
+              <a:t>Yellow:</a:t>
+            </a:r>
+            <a:r>
+              <a:rPr lang="en-US" dirty="0" smtClean="0"/>
+              <a:t> Under</a:t>
+            </a:r>
+            <a:endParaRPr lang="en-US" dirty="0"/>
+          </a:p>
+        </p:txBody>
+      </p:sp>
+    </p:spTree>
+    <p:extLst>
+      <p:ext uri="{BB962C8B-B14F-4D97-AF65-F5344CB8AC3E}">
+        <p14:creationId xmlns:p14="http://schemas.microsoft.com/office/powerpoint/2010/main" val="1474098577"/>
+      </p:ext>
+    </p:extLst>
+  </p:cSld>
+  <p:clrMapOvr>
+    <a:masterClrMapping/>
+  </p:clrMapOvr>
+</p:sld>
+</file>
+
+<file path=ppt/slides/slide11.xml><?xml version="1.0" encoding="utf-8"?>
+<p:sld xmlns:a="http://schemas.openxmlformats.org/drawingml/2006/main" xmlns:r="http://schemas.openxmlformats.org/officeDocument/2006/relationships" xmlns:p="http://schemas.openxmlformats.org/presentationml/2006/main">
+  <p:cSld>
+    <p:spTree>
+      <p:nvGrpSpPr>
+        <p:cNvPr id="1" name=""/>
+        <p:cNvGrpSpPr/>
+        <p:nvPr/>
+      </p:nvGrpSpPr>
+      <p:grpSpPr>
+        <a:xfrm>
+          <a:off x="0" y="0"/>
+          <a:ext cx="0" cy="0"/>
+          <a:chOff x="0" y="0"/>
+          <a:chExt cx="0" cy="0"/>
+        </a:xfrm>
+      </p:grpSpPr>
+      <p:sp>
+        <p:nvSpPr>
+          <p:cNvPr id="2" name="Title 1"/>
+          <p:cNvSpPr>
+            <a:spLocks noGrp="1"/>
+          </p:cNvSpPr>
+          <p:nvPr>
+            <p:ph type="title"/>
+          </p:nvPr>
+        </p:nvSpPr>
+        <p:spPr/>
+        <p:txBody>
+          <a:bodyPr/>
+          <a:lstStyle/>
+          <a:p>
+            <a:r>
+              <a:rPr lang="en-US" dirty="0" smtClean="0"/>
+              <a:t>Pic with Array</a:t>
+            </a:r>
+            <a:endParaRPr lang="en-US" dirty="0"/>
+          </a:p>
+        </p:txBody>
+      </p:sp>
+      <p:pic>
+        <p:nvPicPr>
+          <p:cNvPr id="4" name="Content Placeholder 3"/>
+          <p:cNvPicPr>
+            <a:picLocks noGrp="1" noChangeAspect="1"/>
+          </p:cNvPicPr>
+          <p:nvPr>
+            <p:ph idx="1"/>
+          </p:nvPr>
+        </p:nvPicPr>
+        <p:blipFill>
+          <a:blip r:embed="rId2">
+            <a:extLst>
+              <a:ext uri="{28A0092B-C50C-407E-A947-70E740481C1C}">
+                <a14:useLocalDpi xmlns:a14="http://schemas.microsoft.com/office/drawing/2010/main" val="0"/>
+              </a:ext>
+            </a:extLst>
+          </a:blip>
+          <a:stretch>
+            <a:fillRect/>
+          </a:stretch>
+        </p:blipFill>
+        <p:spPr>
+          <a:xfrm>
+            <a:off x="124200" y="2356451"/>
+            <a:ext cx="4000000" cy="4000000"/>
+          </a:xfrm>
+        </p:spPr>
+      </p:pic>
+      <p:sp>
+        <p:nvSpPr>
+          <p:cNvPr id="5" name="Content 1"/>
+          <p:cNvSpPr txBox="1"/>
+          <p:nvPr/>
+        </p:nvSpPr>
+        <p:spPr>
+          <a:xfrm>
+            <a:off x="4490000" y="2556451"/>
+            <a:ext cx="4500000" cy="3000000"/>
+          </a:xfrm>
+          <a:prstGeom prst="rect">
+            <a:avLst/>
+          </a:prstGeom>
+          <a:noFill/>
+        </p:spPr>
+        <p:txBody>
+          <a:bodyPr wrap="square" rtlCol="0">
+            <a:spAutoFit/>
+          </a:bodyPr>
+          <a:lstStyle/>
+          <a:p>
+            <a:r>
+              <a:rPr lang="en-US" dirty="0" smtClean="0"/>
+              <a:t>Beautiful!</a:t>
+            </a:r>
+            <a:endParaRPr lang="en-US" dirty="0"/>
+          </a:p>
+          <a:p>
+            <a:r>
+              <a:rPr lang="en-US" dirty="0" smtClean="0"/>
+              <a:t>Giant!</a:t>
+            </a:r>
+            <a:endParaRPr lang="en-US" dirty="0"/>
+          </a:p>
+        </p:txBody>
+      </p:sp>
+    </p:spTree>
+    <p:extLst>
+      <p:ext uri="{BB962C8B-B14F-4D97-AF65-F5344CB8AC3E}">
+        <p14:creationId xmlns:p14="http://schemas.microsoft.com/office/powerpoint/2010/main" val="1474098577"/>
+      </p:ext>
+    </p:extLst>
+  </p:cSld>
+  <p:clrMapOvr>
+    <a:masterClrMapping/>
+  </p:clrMapOvr>
+</p:sld>
+</file>
+
 <file path=ppt/slides/slide2.xml><?xml version="1.0" encoding="utf-8"?>
 <p:sld xmlns:a="http://schemas.openxmlformats.org/drawingml/2006/main" xmlns:r="http://schemas.openxmlformats.org/officeDocument/2006/relationships" xmlns:p="http://schemas.openxmlformats.org/presentationml/2006/main">
   <p:cSld>
@@ -3669,6 +3940,118 @@
     <p:extLst>
       <p:ext uri="{BB962C8B-B14F-4D97-AF65-F5344CB8AC3E}">
         <p14:creationId xmlns:p14="http://schemas.microsoft.com/office/powerpoint/2010/main" val="4058324642"/>
+      </p:ext>
+    </p:extLst>
+  </p:cSld>
+  <p:clrMapOvr>
+    <a:masterClrMapping/>
+  </p:clrMapOvr>
+</p:sld>
+</file>
+
+<file path=ppt/slides/slide9.xml><?xml version="1.0" encoding="utf-8"?>
+<p:sld xmlns:a="http://schemas.openxmlformats.org/drawingml/2006/main" xmlns:r="http://schemas.openxmlformats.org/officeDocument/2006/relationships" xmlns:p="http://schemas.openxmlformats.org/presentationml/2006/main">
+  <p:cSld>
+    <p:spTree>
+      <p:nvGrpSpPr>
+        <p:cNvPr id="1" name=""/>
+        <p:cNvGrpSpPr/>
+        <p:nvPr/>
+      </p:nvGrpSpPr>
+      <p:grpSpPr>
+        <a:xfrm>
+          <a:off x="0" y="0"/>
+          <a:ext cx="0" cy="0"/>
+          <a:chOff x="0" y="0"/>
+          <a:chExt cx="0" cy="0"/>
+        </a:xfrm>
+      </p:grpSpPr>
+      <p:sp>
+        <p:nvSpPr>
+          <p:cNvPr id="2" name="Title 1"/>
+          <p:cNvSpPr>
+            <a:spLocks noGrp="1"/>
+          </p:cNvSpPr>
+          <p:nvPr>
+            <p:ph type="title"/>
+          </p:nvPr>
+        </p:nvSpPr>
+        <p:spPr/>
+        <p:txBody>
+          <a:bodyPr/>
+          <a:lstStyle/>
+          <a:p>
+            <a:r>
+              <a:rPr lang="en-US" dirty="0" smtClean="0"/>
+              <a:t>Pic with String</a:t>
+            </a:r>
+            <a:endParaRPr lang="en-US" dirty="0"/>
+          </a:p>
+        </p:txBody>
+      </p:sp>
+      <p:pic>
+        <p:nvPicPr>
+          <p:cNvPr id="4" name="Content Placeholder 3"/>
+          <p:cNvPicPr>
+            <a:picLocks noGrp="1" noChangeAspect="1"/>
+          </p:cNvPicPr>
+          <p:nvPr>
+            <p:ph idx="1"/>
+          </p:nvPr>
+        </p:nvPicPr>
+        <p:blipFill>
+          <a:blip r:embed="rId2">
+            <a:extLst>
+              <a:ext uri="{28A0092B-C50C-407E-A947-70E740481C1C}">
+                <a14:useLocalDpi xmlns:a14="http://schemas.microsoft.com/office/drawing/2010/main" val="0"/>
+              </a:ext>
+            </a:extLst>
+          </a:blip>
+          <a:stretch>
+            <a:fillRect/>
+          </a:stretch>
+        </p:blipFill>
+        <p:spPr>
+          <a:xfrm>
+            <a:off x="124200" y="2356451"/>
+            <a:ext cx="4000000" cy="4000000"/>
+          </a:xfrm>
+        </p:spPr>
+      </p:pic>
+      <p:sp>
+        <p:nvSpPr>
+          <p:cNvPr id="5" name="Content 1"/>
+          <p:cNvSpPr txBox="1"/>
+          <p:nvPr/>
+        </p:nvSpPr>
+        <p:spPr>
+          <a:xfrm>
+            <a:off x="4490000" y="2556451"/>
+            <a:ext cx="4500000" cy="3000000"/>
+          </a:xfrm>
+          <a:prstGeom prst="rect">
+            <a:avLst/>
+          </a:prstGeom>
+          <a:noFill/>
+        </p:spPr>
+        <p:txBody>
+          <a:bodyPr wrap="square" rtlCol="0">
+            <a:spAutoFit/>
+          </a:bodyPr>
+          <a:lstStyle/>
+          <a:p>
+            <a:r>
+              <a:rPr lang="en-US" dirty="0" smtClean="0"/>
+              <a:t>This is the logo of Google!</a:t>
+            </a:r>
+            <a:endParaRPr lang="en-US" dirty="0"/>
+          </a:p>
+        </p:txBody>
+      </p:sp>
+    </p:spTree>
+    <p:extLst>
+      <p:ext uri="{BB962C8B-B14F-4D97-AF65-F5344CB8AC3E}">
+        <p14:creationId xmlns:p14="http://schemas.microsoft.com/office/powerpoint/2010/main" val="1474098577"/>
       </p:ext>
     </p:extLst>
   </p:cSld>

</xml_diff>

<commit_message>
Fix test removed local path
* Fixed amateur hour mistake with local path in test
</commit_message>
<xml_diff>
--- a/samples/pptx/sample.pptx
+++ b/samples/pptx/sample.pptx
@@ -12,6 +12,9 @@
     <p:sldId id="260" r:id="rId10"/>
     <p:sldId id="261" r:id="rId11"/>
     <p:sldId id="262" r:id="rId12"/>
+    <p:sldId id="263" r:id="rId13"/>
+    <p:sldId id="264" r:id="rId14"/>
+    <p:sldId id="265" r:id="rId15"/>
   </p:sldIdLst>
   <p:sldSz cx="9144000" cy="6858000" type="screen4x3"/>
   <p:notesSz cx="6858000" cy="9144000"/>
@@ -3140,6 +3143,88 @@
 </p:sld>
 </file>
 
+<file path=ppt/slides/slide10.xml><?xml version="1.0" encoding="utf-8"?>
+<p:sld xmlns:a="http://schemas.openxmlformats.org/drawingml/2006/main" xmlns:p="http://schemas.openxmlformats.org/presentationml/2006/main" xmlns:r="http://schemas.openxmlformats.org/officeDocument/2006/relationships">
+  <p:cSld>
+    <p:spTree>
+      <p:nvGrpSpPr>
+        <p:cNvPr id="1" name=""/>
+        <p:cNvGrpSpPr/>
+        <p:nvPr/>
+      </p:nvGrpSpPr>
+      <p:grpSpPr>
+        <a:xfrm>
+          <a:off x="0" y="0"/>
+          <a:ext cx="0" cy="0"/>
+          <a:chOff x="0" y="0"/>
+          <a:chExt cx="0" cy="0"/>
+        </a:xfrm>
+      </p:grpSpPr>
+      <p:sp>
+        <p:nvSpPr>
+          <p:cNvPr id="2" name="Title 1"/>
+          <p:cNvSpPr>
+            <a:spLocks noGrp="1"/>
+          </p:cNvSpPr>
+          <p:nvPr>
+            <p:ph type="title"/>
+          </p:nvPr>
+        </p:nvSpPr>
+        <p:spPr/>
+        <p:txBody>
+          <a:bodyPr/>
+          <a:lstStyle/>
+          <a:p>
+            <a:r>
+              <a:rPr dirty="0" lang="en-US" smtClean="0"/>
+              <a:t>Why Android?</a:t>
+            </a:r>
+            <a:endParaRPr dirty="0" lang="en-US"/>
+          </a:p>
+        </p:txBody>
+      </p:sp>
+      <p:sp>
+        <p:nvSpPr>
+          <p:cNvPr id="3" name="Content Placeholder 2"/>
+          <p:cNvSpPr>
+            <a:spLocks noGrp="1"/>
+          </p:cNvSpPr>
+          <p:nvPr>
+            <p:ph idx="1"/>
+          </p:nvPr>
+        </p:nvSpPr>
+        <p:spPr/>
+        <p:txBody>
+          <a:bodyPr/>
+          <a:lstStyle/>
+          <a:p>
+            <a:r>
+              <a:rPr dirty="0" lang="en-US" smtClean="0"/>
+              <a:t>Its great!</a:t>
+            </a:r>
+          </a:p>
+          <a:p>
+            <a:r>
+              <a:rPr dirty="0" lang="en-US" smtClean="0"/>
+              <a:t>Its sweet!</a:t>
+            </a:r>
+            <a:endParaRPr lang="en-US"/>
+          </a:p>
+        </p:txBody>
+      </p:sp>
+    </p:spTree>
+    <p:extLst>
+      <p:ext uri="{BB962C8B-B14F-4D97-AF65-F5344CB8AC3E}">
+        <p14:creationId xmlns:p14="http://schemas.microsoft.com/office/powerpoint/2010/main" val="1231192379"/>
+      </p:ext>
+    </p:extLst>
+  </p:cSld>
+  <p:clrMapOvr>
+    <a:masterClrMapping/>
+  </p:clrMapOvr>
+</p:sld>
+</file>
+
 <file path=ppt/slides/slide2.xml><?xml version="1.0" encoding="utf-8"?>
 <p:sld xmlns:a="http://schemas.openxmlformats.org/drawingml/2006/main" xmlns:p="http://schemas.openxmlformats.org/presentationml/2006/main" xmlns:r="http://schemas.openxmlformats.org/officeDocument/2006/relationships">
   <p:cSld>
@@ -3339,91 +3424,6 @@
             <a:r>
               <a:rPr dirty="0" lang="en-US" smtClean="0"/>
               <a:t>JPG Logo</a:t>
-            </a:r>
-            <a:endParaRPr dirty="0" lang="en-US"/>
-          </a:p>
-        </p:txBody>
-      </p:sp>
-      <p:pic>
-        <p:nvPicPr>
-          <p:cNvPr id="4" name="Content Placeholder 3"/>
-          <p:cNvPicPr>
-            <a:picLocks noChangeAspect="1" noGrp="1"/>
-          </p:cNvPicPr>
-          <p:nvPr>
-            <p:ph idx="1"/>
-          </p:nvPr>
-        </p:nvPicPr>
-        <p:blipFill>
-          <a:blip r:embed="rId2">
-            <a:extLst>
-              <a:ext uri="{28A0092B-C50C-407E-A947-70E740481C1C}">
-                <a14:useLocalDpi xmlns:a14="http://schemas.microsoft.com/office/drawing/2010/main" val="0"/>
-              </a:ext>
-            </a:extLst>
-          </a:blip>
-          <a:stretch>
-            <a:fillRect/>
-          </a:stretch>
-        </p:blipFill>
-        <p:spPr>
-          <a:xfrm>
-            <a:off x="2159000" y="1524000"/>
-            <a:ext cx="4826000" cy="1689100"/>
-          </a:xfrm>
-          <a:prstGeom prst="rect">
-            <a:avLst/>
-          </a:prstGeom>
-        </p:spPr>
-      </p:pic>
-    </p:spTree>
-    <p:extLst>
-      <p:ext uri="{BB962C8B-B14F-4D97-AF65-F5344CB8AC3E}">
-        <p14:creationId xmlns:p14="http://schemas.microsoft.com/office/powerpoint/2010/main" val="1474098577"/>
-      </p:ext>
-    </p:extLst>
-  </p:cSld>
-  <p:clrMapOvr>
-    <a:masterClrMapping/>
-  </p:clrMapOvr>
-</p:sld>
-</file>
-
-<file path=ppt/slides/slide5.xml><?xml version="1.0" encoding="utf-8"?>
-<p:sld xmlns:a="http://schemas.openxmlformats.org/drawingml/2006/main" xmlns:p="http://schemas.openxmlformats.org/presentationml/2006/main" xmlns:r="http://schemas.openxmlformats.org/officeDocument/2006/relationships">
-  <p:cSld>
-    <p:spTree>
-      <p:nvGrpSpPr>
-        <p:cNvPr id="1" name=""/>
-        <p:cNvGrpSpPr/>
-        <p:nvPr/>
-      </p:nvGrpSpPr>
-      <p:grpSpPr>
-        <a:xfrm>
-          <a:off x="0" y="0"/>
-          <a:ext cx="0" cy="0"/>
-          <a:chOff x="0" y="0"/>
-          <a:chExt cx="0" cy="0"/>
-        </a:xfrm>
-      </p:grpSpPr>
-      <p:sp>
-        <p:nvSpPr>
-          <p:cNvPr id="2" name="Title 1"/>
-          <p:cNvSpPr>
-            <a:spLocks noGrp="1"/>
-          </p:cNvSpPr>
-          <p:nvPr>
-            <p:ph type="title"/>
-          </p:nvPr>
-        </p:nvSpPr>
-        <p:spPr/>
-        <p:txBody>
-          <a:bodyPr/>
-          <a:lstStyle/>
-          <a:p>
-            <a:r>
-              <a:rPr dirty="0" lang="en-US" smtClean="0"/>
-              <a:t>PNG Logo</a:t>
             </a:r>
             <a:endParaRPr dirty="0" lang="en-US"/>
           </a:p>
@@ -3474,7 +3474,428 @@
 </p:sld>
 </file>
 
+<file path=ppt/slides/slide5.xml><?xml version="1.0" encoding="utf-8"?>
+<p:sld xmlns:a="http://schemas.openxmlformats.org/drawingml/2006/main" xmlns:r="http://schemas.openxmlformats.org/officeDocument/2006/relationships" xmlns:p="http://schemas.openxmlformats.org/presentationml/2006/main">
+  <p:cSld>
+    <p:spTree>
+      <p:nvGrpSpPr>
+        <p:cNvPr id="1" name=""/>
+        <p:cNvGrpSpPr/>
+        <p:nvPr/>
+      </p:nvGrpSpPr>
+      <p:grpSpPr>
+        <a:xfrm>
+          <a:off x="0" y="0"/>
+          <a:ext cx="0" cy="0"/>
+          <a:chOff x="0" y="0"/>
+          <a:chExt cx="0" cy="0"/>
+        </a:xfrm>
+      </p:grpSpPr>
+      <p:sp>
+        <p:nvSpPr>
+          <p:cNvPr id="2" name="Title 1"/>
+          <p:cNvSpPr>
+            <a:spLocks noGrp="1"/>
+          </p:cNvSpPr>
+          <p:nvPr>
+            <p:ph type="title"/>
+          </p:nvPr>
+        </p:nvSpPr>
+        <p:spPr/>
+        <p:txBody>
+          <a:bodyPr/>
+          <a:lstStyle/>
+          <a:p>
+            <a:r>
+              <a:rPr lang="en-US" dirty="0" smtClean="0"/>
+              <a:t>Text Pic Split</a:t>
+            </a:r>
+            <a:endParaRPr lang="en-US" dirty="0"/>
+          </a:p>
+        </p:txBody>
+      </p:sp>
+      <p:sp>
+        <p:nvSpPr>
+          <p:cNvPr id="3" name="Content Placeholder 2"/>
+          <p:cNvSpPr>
+            <a:spLocks noGrp="1"/>
+          </p:cNvSpPr>
+          <p:nvPr>
+            <p:ph sz="half" idx="1"/>
+          </p:nvPr>
+        </p:nvSpPr>
+        <p:spPr/>
+        <p:txBody>
+          <a:bodyPr/>
+          <a:lstStyle/>
+          <a:p>
+            <a:r>
+              <a:rPr lang="en-US" dirty="0" smtClean="0"/>
+              <a:t>Here is a string</a:t>
+            </a:r>
+          </a:p>
+          <a:p>
+            <a:r>
+              <a:rPr lang="en-US" dirty="0" smtClean="0"/>
+              <a:t>here is another</a:t>
+            </a:r>
+            <a:endParaRPr lang="en-US"/>
+          </a:p>
+        </p:txBody>
+      </p:sp>
+      <p:pic>
+        <p:nvPicPr>
+          <p:cNvPr id="4" name="Content Placeholder 3"/>
+          <p:cNvPicPr>
+            <a:picLocks noGrp="1" noChangeAspect="1"/>
+          </p:cNvPicPr>
+          <p:nvPr>
+            <p:ph sz="half" idx="2"/>
+          </p:nvPr>
+        </p:nvPicPr>
+        <p:blipFill>
+          <a:blip r:embed="rId2">
+            <a:extLst>
+              <a:ext uri="{28A0092B-C50C-407E-A947-70E740481C1C}">
+                <a14:useLocalDpi xmlns:a14="http://schemas.microsoft.com/office/drawing/2010/main" val="0"/>
+              </a:ext>
+            </a:extLst>
+          </a:blip>
+          <a:stretch>
+            <a:fillRect/>
+          </a:stretch>
+        </p:blipFill>
+        <p:spPr>
+          <a:xfrm>
+            <a:off x="4572000" y="1524000"/>
+            <a:ext cx="3556000" cy="2667000"/>
+          </a:xfrm>
+          <a:prstGeom prst="rect">
+            <a:avLst/>
+          </a:prstGeom>
+        </p:spPr>
+      </p:pic>
+    </p:spTree>
+    <p:extLst>
+      <p:ext uri="{BB962C8B-B14F-4D97-AF65-F5344CB8AC3E}">
+        <p14:creationId xmlns:p14="http://schemas.microsoft.com/office/powerpoint/2010/main" val="1435759726"/>
+      </p:ext>
+    </p:extLst>
+  </p:cSld>
+  <p:clrMapOvr>
+    <a:masterClrMapping/>
+  </p:clrMapOvr>
+</p:sld>
+</file>
+
 <file path=ppt/slides/slide6.xml><?xml version="1.0" encoding="utf-8"?>
+<p:sld xmlns:a="http://schemas.openxmlformats.org/drawingml/2006/main" xmlns:p="http://schemas.openxmlformats.org/presentationml/2006/main" xmlns:r="http://schemas.openxmlformats.org/officeDocument/2006/relationships">
+  <p:cSld>
+    <p:spTree>
+      <p:nvGrpSpPr>
+        <p:cNvPr id="1" name=""/>
+        <p:cNvGrpSpPr/>
+        <p:nvPr/>
+      </p:nvGrpSpPr>
+      <p:grpSpPr>
+        <a:xfrm>
+          <a:off x="0" y="0"/>
+          <a:ext cx="0" cy="0"/>
+          <a:chOff x="0" y="0"/>
+          <a:chExt cx="0" cy="0"/>
+        </a:xfrm>
+      </p:grpSpPr>
+      <p:sp>
+        <p:nvSpPr>
+          <p:cNvPr id="2" name="Title 1"/>
+          <p:cNvSpPr>
+            <a:spLocks noGrp="1"/>
+          </p:cNvSpPr>
+          <p:nvPr>
+            <p:ph type="title"/>
+          </p:nvPr>
+        </p:nvSpPr>
+        <p:spPr/>
+        <p:txBody>
+          <a:bodyPr/>
+          <a:lstStyle/>
+          <a:p>
+            <a:r>
+              <a:rPr dirty="0" lang="en-US" smtClean="0"/>
+              <a:t>PNG Logo</a:t>
+            </a:r>
+            <a:endParaRPr dirty="0" lang="en-US"/>
+          </a:p>
+        </p:txBody>
+      </p:sp>
+      <p:pic>
+        <p:nvPicPr>
+          <p:cNvPr id="4" name="Content Placeholder 3"/>
+          <p:cNvPicPr>
+            <a:picLocks noChangeAspect="1" noGrp="1"/>
+          </p:cNvPicPr>
+          <p:nvPr>
+            <p:ph idx="1"/>
+          </p:nvPr>
+        </p:nvPicPr>
+        <p:blipFill>
+          <a:blip r:embed="rId2">
+            <a:extLst>
+              <a:ext uri="{28A0092B-C50C-407E-A947-70E740481C1C}">
+                <a14:useLocalDpi xmlns:a14="http://schemas.microsoft.com/office/drawing/2010/main" val="0"/>
+              </a:ext>
+            </a:extLst>
+          </a:blip>
+          <a:stretch>
+            <a:fillRect/>
+          </a:stretch>
+        </p:blipFill>
+        <p:spPr>
+          <a:xfrm>
+            <a:off x="2794000" y="1524000"/>
+            <a:ext cx="3556000" cy="2667000"/>
+          </a:xfrm>
+          <a:prstGeom prst="rect">
+            <a:avLst/>
+          </a:prstGeom>
+        </p:spPr>
+      </p:pic>
+    </p:spTree>
+    <p:extLst>
+      <p:ext uri="{BB962C8B-B14F-4D97-AF65-F5344CB8AC3E}">
+        <p14:creationId xmlns:p14="http://schemas.microsoft.com/office/powerpoint/2010/main" val="1474098577"/>
+      </p:ext>
+    </p:extLst>
+  </p:cSld>
+  <p:clrMapOvr>
+    <a:masterClrMapping/>
+  </p:clrMapOvr>
+</p:sld>
+</file>
+
+<file path=ppt/slides/slide7.xml><?xml version="1.0" encoding="utf-8"?>
+<p:sld xmlns:a="http://schemas.openxmlformats.org/drawingml/2006/main" xmlns:r="http://schemas.openxmlformats.org/officeDocument/2006/relationships" xmlns:p="http://schemas.openxmlformats.org/presentationml/2006/main">
+  <p:cSld>
+    <p:spTree>
+      <p:nvGrpSpPr>
+        <p:cNvPr id="1" name=""/>
+        <p:cNvGrpSpPr/>
+        <p:nvPr/>
+      </p:nvGrpSpPr>
+      <p:grpSpPr>
+        <a:xfrm>
+          <a:off x="0" y="0"/>
+          <a:ext cx="0" cy="0"/>
+          <a:chOff x="0" y="0"/>
+          <a:chExt cx="0" cy="0"/>
+        </a:xfrm>
+      </p:grpSpPr>
+      <p:sp>
+        <p:nvSpPr>
+          <p:cNvPr id="2" name="Title 1"/>
+          <p:cNvSpPr>
+            <a:spLocks noGrp="1"/>
+          </p:cNvSpPr>
+          <p:nvPr>
+            <p:ph type="title"/>
+          </p:nvPr>
+        </p:nvSpPr>
+        <p:spPr/>
+        <p:txBody>
+          <a:bodyPr/>
+          <a:lstStyle/>
+          <a:p>
+            <a:r>
+              <a:rPr lang="en-US" dirty="0" smtClean="0"/>
+              <a:t>Pic Desc</a:t>
+            </a:r>
+            <a:endParaRPr lang="en-US" dirty="0"/>
+          </a:p>
+        </p:txBody>
+      </p:sp>
+      <p:pic>
+        <p:nvPicPr>
+          <p:cNvPr id="5" name="Picture Placeholder 4"/>
+          <p:cNvPicPr>
+            <a:picLocks noGrp="1" noChangeAspect="1"/>
+          </p:cNvPicPr>
+          <p:nvPr>
+            <p:ph type="pic" idx="1"/>
+          </p:nvPr>
+        </p:nvPicPr>
+        <p:blipFill>
+          <a:blip r:embed="rId2">
+            <a:extLst>
+              <a:ext uri="{28A0092B-C50C-407E-A947-70E740481C1C}">
+                <a14:useLocalDpi xmlns:a14="http://schemas.microsoft.com/office/drawing/2010/main" val="0"/>
+              </a:ext>
+            </a:extLst>
+          </a:blip>
+          <a:stretch>
+            <a:fillRect/>
+          </a:stretch>
+        </p:blipFill>
+        <p:spPr>
+          <a:xfrm>
+            <a:off x="2794000" y="762000"/>
+            <a:ext cx="3556000" cy="2667000"/>
+          </a:xfrm>
+          <a:prstGeom prst="rect">
+            <a:avLst/>
+          </a:prstGeom>
+        </p:spPr>
+      </p:pic>
+      <p:sp>
+        <p:nvSpPr>
+          <p:cNvPr id="4" name="Text Placeholder 4"/>
+          <p:cNvSpPr>
+            <a:spLocks noGrp="1"/>
+          </p:cNvSpPr>
+          <p:nvPr>
+            <p:ph type="body" sz="half" idx="2"/>
+          </p:nvPr>
+        </p:nvSpPr>
+        <p:spPr/>
+        <p:txBody>
+          <a:bodyPr/>
+          <a:lstStyle/>
+          <a:p>
+            <a:r>
+              <a:rPr lang="en-US" dirty="0" smtClean="0"/>
+              <a:t>Here is a string</a:t>
+            </a:r>
+          </a:p>
+          <a:p>
+            <a:r>
+              <a:rPr lang="en-US" dirty="0" smtClean="0"/>
+              <a:t>here is another</a:t>
+            </a:r>
+            <a:endParaRPr lang="en-US"/>
+          </a:p>
+        </p:txBody>
+      </p:sp>
+    </p:spTree>
+    <p:extLst>
+      <p:ext uri="{BB962C8B-B14F-4D97-AF65-F5344CB8AC3E}">
+        <p14:creationId xmlns:p14="http://schemas.microsoft.com/office/powerpoint/2010/main" val="1435759726"/>
+      </p:ext>
+    </p:extLst>
+  </p:cSld>
+  <p:clrMapOvr>
+    <a:masterClrMapping/>
+  </p:clrMapOvr>
+</p:sld>
+</file>
+
+<file path=ppt/slides/slide8.xml><?xml version="1.0" encoding="utf-8"?>
+<p:sld xmlns:a="http://schemas.openxmlformats.org/drawingml/2006/main" xmlns:r="http://schemas.openxmlformats.org/officeDocument/2006/relationships" xmlns:p="http://schemas.openxmlformats.org/presentationml/2006/main">
+  <p:cSld>
+    <p:spTree>
+      <p:nvGrpSpPr>
+        <p:cNvPr id="1" name=""/>
+        <p:cNvGrpSpPr/>
+        <p:nvPr/>
+      </p:nvGrpSpPr>
+      <p:grpSpPr>
+        <a:xfrm>
+          <a:off x="0" y="0"/>
+          <a:ext cx="0" cy="0"/>
+          <a:chOff x="0" y="0"/>
+          <a:chExt cx="0" cy="0"/>
+        </a:xfrm>
+      </p:grpSpPr>
+      <p:sp>
+        <p:nvSpPr>
+          <p:cNvPr id="2" name="Title 1"/>
+          <p:cNvSpPr>
+            <a:spLocks noGrp="1"/>
+          </p:cNvSpPr>
+          <p:nvPr>
+            <p:ph type="title"/>
+          </p:nvPr>
+        </p:nvSpPr>
+        <p:spPr/>
+        <p:txBody>
+          <a:bodyPr/>
+          <a:lstStyle/>
+          <a:p>
+            <a:r>
+              <a:rPr lang="en-US" dirty="0" smtClean="0"/>
+              <a:t>JPG Logo</a:t>
+            </a:r>
+            <a:endParaRPr lang="en-US" dirty="0"/>
+          </a:p>
+        </p:txBody>
+      </p:sp>
+      <p:pic>
+        <p:nvPicPr>
+          <p:cNvPr id="5" name="Picture Placeholder 4"/>
+          <p:cNvPicPr>
+            <a:picLocks noGrp="1" noChangeAspect="1"/>
+          </p:cNvPicPr>
+          <p:nvPr>
+            <p:ph type="pic" idx="1"/>
+          </p:nvPr>
+        </p:nvPicPr>
+        <p:blipFill>
+          <a:blip r:embed="rId2">
+            <a:extLst>
+              <a:ext uri="{28A0092B-C50C-407E-A947-70E740481C1C}">
+                <a14:useLocalDpi xmlns:a14="http://schemas.microsoft.com/office/drawing/2010/main" val="0"/>
+              </a:ext>
+            </a:extLst>
+          </a:blip>
+          <a:stretch>
+            <a:fillRect/>
+          </a:stretch>
+        </p:blipFill>
+        <p:spPr>
+          <a:xfrm>
+            <a:off x="2159000" y="762000"/>
+            <a:ext cx="4826000" cy="1689100"/>
+          </a:xfrm>
+          <a:prstGeom prst="rect">
+            <a:avLst/>
+          </a:prstGeom>
+        </p:spPr>
+      </p:pic>
+      <p:sp>
+        <p:nvSpPr>
+          <p:cNvPr id="4" name="Text Placeholder 4"/>
+          <p:cNvSpPr>
+            <a:spLocks noGrp="1"/>
+          </p:cNvSpPr>
+          <p:nvPr>
+            <p:ph type="body" sz="half" idx="2"/>
+          </p:nvPr>
+        </p:nvSpPr>
+        <p:spPr/>
+        <p:txBody>
+          <a:bodyPr/>
+          <a:lstStyle/>
+          <a:p>
+            <a:r>
+              <a:rPr lang="en-US" dirty="0" smtClean="0"/>
+              <a:t>descriptions</a:t>
+            </a:r>
+            <a:endParaRPr lang="en-US"/>
+          </a:p>
+        </p:txBody>
+      </p:sp>
+    </p:spTree>
+    <p:extLst>
+      <p:ext uri="{BB962C8B-B14F-4D97-AF65-F5344CB8AC3E}">
+        <p14:creationId xmlns:p14="http://schemas.microsoft.com/office/powerpoint/2010/main" val="1435759726"/>
+      </p:ext>
+    </p:extLst>
+  </p:cSld>
+  <p:clrMapOvr>
+    <a:masterClrMapping/>
+  </p:clrMapOvr>
+</p:sld>
+</file>
+
+<file path=ppt/slides/slide9.xml><?xml version="1.0" encoding="utf-8"?>
 <p:sld xmlns:a="http://schemas.openxmlformats.org/drawingml/2006/main" xmlns:p="http://schemas.openxmlformats.org/presentationml/2006/main" xmlns:r="http://schemas.openxmlformats.org/officeDocument/2006/relationships">
   <p:cSld>
     <p:spTree>
@@ -3550,88 +3971,6 @@
     <p:extLst>
       <p:ext uri="{BB962C8B-B14F-4D97-AF65-F5344CB8AC3E}">
         <p14:creationId xmlns:p14="http://schemas.microsoft.com/office/powerpoint/2010/main" val="1474098577"/>
-      </p:ext>
-    </p:extLst>
-  </p:cSld>
-  <p:clrMapOvr>
-    <a:masterClrMapping/>
-  </p:clrMapOvr>
-</p:sld>
-</file>
-
-<file path=ppt/slides/slide7.xml><?xml version="1.0" encoding="utf-8"?>
-<p:sld xmlns:a="http://schemas.openxmlformats.org/drawingml/2006/main" xmlns:p="http://schemas.openxmlformats.org/presentationml/2006/main" xmlns:r="http://schemas.openxmlformats.org/officeDocument/2006/relationships">
-  <p:cSld>
-    <p:spTree>
-      <p:nvGrpSpPr>
-        <p:cNvPr id="1" name=""/>
-        <p:cNvGrpSpPr/>
-        <p:nvPr/>
-      </p:nvGrpSpPr>
-      <p:grpSpPr>
-        <a:xfrm>
-          <a:off x="0" y="0"/>
-          <a:ext cx="0" cy="0"/>
-          <a:chOff x="0" y="0"/>
-          <a:chExt cx="0" cy="0"/>
-        </a:xfrm>
-      </p:grpSpPr>
-      <p:sp>
-        <p:nvSpPr>
-          <p:cNvPr id="2" name="Title 1"/>
-          <p:cNvSpPr>
-            <a:spLocks noGrp="1"/>
-          </p:cNvSpPr>
-          <p:nvPr>
-            <p:ph type="title"/>
-          </p:nvPr>
-        </p:nvSpPr>
-        <p:spPr/>
-        <p:txBody>
-          <a:bodyPr/>
-          <a:lstStyle/>
-          <a:p>
-            <a:r>
-              <a:rPr dirty="0" lang="en-US" smtClean="0"/>
-              <a:t>Why Android?</a:t>
-            </a:r>
-            <a:endParaRPr dirty="0" lang="en-US"/>
-          </a:p>
-        </p:txBody>
-      </p:sp>
-      <p:sp>
-        <p:nvSpPr>
-          <p:cNvPr id="3" name="Content Placeholder 2"/>
-          <p:cNvSpPr>
-            <a:spLocks noGrp="1"/>
-          </p:cNvSpPr>
-          <p:nvPr>
-            <p:ph idx="1"/>
-          </p:nvPr>
-        </p:nvSpPr>
-        <p:spPr/>
-        <p:txBody>
-          <a:bodyPr/>
-          <a:lstStyle/>
-          <a:p>
-            <a:r>
-              <a:rPr dirty="0" lang="en-US" smtClean="0"/>
-              <a:t>Its great!</a:t>
-            </a:r>
-          </a:p>
-          <a:p>
-            <a:r>
-              <a:rPr dirty="0" lang="en-US" smtClean="0"/>
-              <a:t>Its sweet!</a:t>
-            </a:r>
-            <a:endParaRPr lang="en-US"/>
-          </a:p>
-        </p:txBody>
-      </p:sp>
-    </p:spTree>
-    <p:extLst>
-      <p:ext uri="{BB962C8B-B14F-4D97-AF65-F5344CB8AC3E}">
-        <p14:creationId xmlns:p14="http://schemas.microsoft.com/office/powerpoint/2010/main" val="1231192379"/>
       </p:ext>
     </p:extLst>
   </p:cSld>

</xml_diff>

<commit_message>
Hardcode slideLayout1 in each rel view
</commit_message>
<xml_diff>
--- a/samples/pptx/sample.pptx
+++ b/samples/pptx/sample.pptx
@@ -3292,7 +3292,7 @@
                     <a:bodyPr lIns="90000" rIns="90000" tIns="46800" bIns="46800"/>
                     <a:p>
                       <a:r>
-                        <a:rPr b="0" lang="pt-PT" sz="1800" spc="-1" strike="noStrike">
+                        <a:rPr b="0" lang="en-US" sz="1800" spc="-1" strike="noStrike">
                           <a:solidFill>
                             <a:srgbClr val="000000"/>
                           </a:solidFill>
@@ -3305,7 +3305,7 @@
                         </a:rPr>
                         <a:t>Row1Cell1</a:t>
                       </a:r>
-                      <a:endParaRPr b="0" lang="pt-PT" sz="1800" spc="-1" strike="noStrike">
+                      <a:endParaRPr b="0" lang="en-US" sz="1800" spc="-1" strike="noStrike">
                         <a:solidFill>
                           <a:srgbClr val="000000"/>
                         </a:solidFill>
@@ -3349,7 +3349,7 @@
                     <a:bodyPr lIns="90000" rIns="90000" tIns="46800" bIns="46800"/>
                     <a:p>
                       <a:r>
-                        <a:rPr b="0" lang="pt-PT" sz="1800" spc="-1" strike="noStrike">
+                        <a:rPr b="0" lang="en-US" sz="1800" spc="-1" strike="noStrike">
                           <a:solidFill>
                             <a:srgbClr val="000000"/>
                           </a:solidFill>
@@ -3362,7 +3362,7 @@
                         </a:rPr>
                         <a:t>Row1Cell1</a:t>
                       </a:r>
-                      <a:endParaRPr b="0" lang="pt-PT" sz="1800" spc="-1" strike="noStrike">
+                      <a:endParaRPr b="0" lang="en-US" sz="1800" spc="-1" strike="noStrike">
                         <a:solidFill>
                           <a:srgbClr val="000000"/>
                         </a:solidFill>
@@ -3408,7 +3408,7 @@
                     <a:bodyPr lIns="90000" rIns="90000" tIns="46800" bIns="46800"/>
                     <a:p>
                       <a:r>
-                        <a:rPr b="0" lang="pt-PT" sz="1800" spc="-1" strike="noStrike">
+                        <a:rPr b="0" lang="en-US" sz="1800" spc="-1" strike="noStrike">
                           <a:solidFill>
                             <a:srgbClr val="000000"/>
                           </a:solidFill>
@@ -3421,7 +3421,7 @@
                         </a:rPr>
                         <a:t>Row2Cell1</a:t>
                       </a:r>
-                      <a:endParaRPr b="0" lang="pt-PT" sz="1800" spc="-1" strike="noStrike">
+                      <a:endParaRPr b="0" lang="en-US" sz="1800" spc="-1" strike="noStrike">
                         <a:solidFill>
                           <a:srgbClr val="000000"/>
                         </a:solidFill>
@@ -3465,7 +3465,7 @@
                     <a:bodyPr lIns="90000" rIns="90000" tIns="46800" bIns="46800"/>
                     <a:p>
                       <a:r>
-                        <a:rPr b="0" lang="pt-PT" sz="1800" spc="-1" strike="noStrike">
+                        <a:rPr b="0" lang="en-US" sz="1800" spc="-1" strike="noStrike">
                           <a:solidFill>
                             <a:srgbClr val="000000"/>
                           </a:solidFill>
@@ -3478,7 +3478,7 @@
                         </a:rPr>
                         <a:t>Row2Cell2</a:t>
                       </a:r>
-                      <a:endParaRPr b="0" lang="pt-PT" sz="1800" spc="-1" strike="noStrike">
+                      <a:endParaRPr b="0" lang="en-US" sz="1800" spc="-1" strike="noStrike">
                         <a:solidFill>
                           <a:srgbClr val="000000"/>
                         </a:solidFill>

</xml_diff>

<commit_message>
extended replaces hub to make more generic
</commit_message>
<xml_diff>
--- a/samples/pptx/sample.pptx
+++ b/samples/pptx/sample.pptx
@@ -4261,4 +4261,287 @@
   <a:objectDefaults/>
   <a:extraClrSchemeLst/>
 </a:theme>
+</file>
+
+<file path=ppt/theme/theme2.xml><?xml version="1.0" encoding="utf-8"?>
+<a:theme xmlns:a="http://schemas.openxmlformats.org/drawingml/2006/main" name="Office Theme">
+  <a:themeElements>
+    <a:clrScheme name="Office">
+      <a:dk1>
+        <a:sysClr val="windowText" lastClr="000000"/>
+      </a:dk1>
+      <a:lt1>
+        <a:sysClr val="window" lastClr="FFFFFF"/>
+      </a:lt1>
+      <a:dk2>
+        <a:srgbClr val="1F497D"/>
+      </a:dk2>
+      <a:lt2>
+        <a:srgbClr val="EEECE1"/>
+      </a:lt2>
+      <a:accent1>
+        <a:srgbClr val="4F81BD"/>
+      </a:accent1>
+      <a:accent2>
+        <a:srgbClr val="C0504D"/>
+      </a:accent2>
+      <a:accent3>
+        <a:srgbClr val="9BBB59"/>
+      </a:accent3>
+      <a:accent4>
+        <a:srgbClr val="8064A2"/>
+      </a:accent4>
+      <a:accent5>
+        <a:srgbClr val="4BACC6"/>
+      </a:accent5>
+      <a:accent6>
+        <a:srgbClr val="F79646"/>
+      </a:accent6>
+      <a:hlink>
+        <a:srgbClr val="0000FF"/>
+      </a:hlink>
+      <a:folHlink>
+        <a:srgbClr val="800080"/>
+      </a:folHlink>
+    </a:clrScheme>
+    <a:fontScheme name="Office">
+      <a:majorFont>
+        <a:latin typeface="Calibri"/>
+        <a:ea typeface=""/>
+        <a:cs typeface=""/>
+        <a:font script="Jpan" typeface="ＭＳ Ｐゴシック"/>
+        <a:font script="Hang" typeface="맑은 고딕"/>
+        <a:font script="Hans" typeface="宋体"/>
+        <a:font script="Hant" typeface="新細明體"/>
+        <a:font script="Arab" typeface="Times New Roman"/>
+        <a:font script="Hebr" typeface="Times New Roman"/>
+        <a:font script="Thai" typeface="Angsana New"/>
+        <a:font script="Ethi" typeface="Nyala"/>
+        <a:font script="Beng" typeface="Vrinda"/>
+        <a:font script="Gujr" typeface="Shruti"/>
+        <a:font script="Khmr" typeface="MoolBoran"/>
+        <a:font script="Knda" typeface="Tunga"/>
+        <a:font script="Guru" typeface="Raavi"/>
+        <a:font script="Cans" typeface="Euphemia"/>
+        <a:font script="Cher" typeface="Plantagenet Cherokee"/>
+        <a:font script="Yiii" typeface="Microsoft Yi Baiti"/>
+        <a:font script="Tibt" typeface="Microsoft Himalaya"/>
+        <a:font script="Thaa" typeface="MV Boli"/>
+        <a:font script="Deva" typeface="Mangal"/>
+        <a:font script="Telu" typeface="Gautami"/>
+        <a:font script="Taml" typeface="Latha"/>
+        <a:font script="Syrc" typeface="Estrangelo Edessa"/>
+        <a:font script="Orya" typeface="Kalinga"/>
+        <a:font script="Mlym" typeface="Kartika"/>
+        <a:font script="Laoo" typeface="DokChampa"/>
+        <a:font script="Sinh" typeface="Iskoola Pota"/>
+        <a:font script="Mong" typeface="Mongolian Baiti"/>
+        <a:font script="Viet" typeface="Times New Roman"/>
+        <a:font script="Uigh" typeface="Microsoft Uighur"/>
+      </a:majorFont>
+      <a:minorFont>
+        <a:latin typeface="Calibri"/>
+        <a:ea typeface=""/>
+        <a:cs typeface=""/>
+        <a:font script="Jpan" typeface="ＭＳ Ｐゴシック"/>
+        <a:font script="Hang" typeface="맑은 고딕"/>
+        <a:font script="Hans" typeface="宋体"/>
+        <a:font script="Hant" typeface="新細明體"/>
+        <a:font script="Arab" typeface="Arial"/>
+        <a:font script="Hebr" typeface="Arial"/>
+        <a:font script="Thai" typeface="Cordia New"/>
+        <a:font script="Ethi" typeface="Nyala"/>
+        <a:font script="Beng" typeface="Vrinda"/>
+        <a:font script="Gujr" typeface="Shruti"/>
+        <a:font script="Khmr" typeface="DaunPenh"/>
+        <a:font script="Knda" typeface="Tunga"/>
+        <a:font script="Guru" typeface="Raavi"/>
+        <a:font script="Cans" typeface="Euphemia"/>
+        <a:font script="Cher" typeface="Plantagenet Cherokee"/>
+        <a:font script="Yiii" typeface="Microsoft Yi Baiti"/>
+        <a:font script="Tibt" typeface="Microsoft Himalaya"/>
+        <a:font script="Thaa" typeface="MV Boli"/>
+        <a:font script="Deva" typeface="Mangal"/>
+        <a:font script="Telu" typeface="Gautami"/>
+        <a:font script="Taml" typeface="Latha"/>
+        <a:font script="Syrc" typeface="Estrangelo Edessa"/>
+        <a:font script="Orya" typeface="Kalinga"/>
+        <a:font script="Mlym" typeface="Kartika"/>
+        <a:font script="Laoo" typeface="DokChampa"/>
+        <a:font script="Sinh" typeface="Iskoola Pota"/>
+        <a:font script="Mong" typeface="Mongolian Baiti"/>
+        <a:font script="Viet" typeface="Arial"/>
+        <a:font script="Uigh" typeface="Microsoft Uighur"/>
+      </a:minorFont>
+    </a:fontScheme>
+    <a:fmtScheme name="Office">
+      <a:fillStyleLst>
+        <a:solidFill>
+          <a:schemeClr val="phClr"/>
+        </a:solidFill>
+        <a:gradFill rotWithShape="1">
+          <a:gsLst>
+            <a:gs pos="0">
+              <a:schemeClr val="phClr">
+                <a:tint val="50000"/>
+                <a:satMod val="300000"/>
+              </a:schemeClr>
+            </a:gs>
+            <a:gs pos="35000">
+              <a:schemeClr val="phClr">
+                <a:tint val="37000"/>
+                <a:satMod val="300000"/>
+              </a:schemeClr>
+            </a:gs>
+            <a:gs pos="100000">
+              <a:schemeClr val="phClr">
+                <a:tint val="15000"/>
+                <a:satMod val="350000"/>
+              </a:schemeClr>
+            </a:gs>
+          </a:gsLst>
+          <a:lin ang="16200000" scaled="1"/>
+        </a:gradFill>
+        <a:gradFill rotWithShape="1">
+          <a:gsLst>
+            <a:gs pos="0">
+              <a:schemeClr val="phClr">
+                <a:shade val="51000"/>
+                <a:satMod val="130000"/>
+              </a:schemeClr>
+            </a:gs>
+            <a:gs pos="80000">
+              <a:schemeClr val="phClr">
+                <a:shade val="93000"/>
+                <a:satMod val="130000"/>
+              </a:schemeClr>
+            </a:gs>
+            <a:gs pos="100000">
+              <a:schemeClr val="phClr">
+                <a:shade val="94000"/>
+                <a:satMod val="135000"/>
+              </a:schemeClr>
+            </a:gs>
+          </a:gsLst>
+          <a:lin ang="16200000" scaled="0"/>
+        </a:gradFill>
+      </a:fillStyleLst>
+      <a:lnStyleLst>
+        <a:ln w="9525" cap="flat" cmpd="sng" algn="ctr">
+          <a:solidFill>
+            <a:schemeClr val="phClr">
+              <a:shade val="95000"/>
+              <a:satMod val="105000"/>
+            </a:schemeClr>
+          </a:solidFill>
+          <a:prstDash val="solid"/>
+        </a:ln>
+        <a:ln w="25400" cap="flat" cmpd="sng" algn="ctr">
+          <a:solidFill>
+            <a:schemeClr val="phClr"/>
+          </a:solidFill>
+          <a:prstDash val="solid"/>
+        </a:ln>
+        <a:ln w="38100" cap="flat" cmpd="sng" algn="ctr">
+          <a:solidFill>
+            <a:schemeClr val="phClr"/>
+          </a:solidFill>
+          <a:prstDash val="solid"/>
+        </a:ln>
+      </a:lnStyleLst>
+      <a:effectStyleLst>
+        <a:effectStyle>
+          <a:effectLst>
+            <a:outerShdw blurRad="40000" dist="20000" dir="5400000" rotWithShape="0">
+              <a:srgbClr val="000000">
+                <a:alpha val="38000"/>
+              </a:srgbClr>
+            </a:outerShdw>
+          </a:effectLst>
+        </a:effectStyle>
+        <a:effectStyle>
+          <a:effectLst>
+            <a:outerShdw blurRad="40000" dist="23000" dir="5400000" rotWithShape="0">
+              <a:srgbClr val="000000">
+                <a:alpha val="35000"/>
+              </a:srgbClr>
+            </a:outerShdw>
+          </a:effectLst>
+        </a:effectStyle>
+        <a:effectStyle>
+          <a:effectLst>
+            <a:outerShdw blurRad="40000" dist="23000" dir="5400000" rotWithShape="0">
+              <a:srgbClr val="000000">
+                <a:alpha val="35000"/>
+              </a:srgbClr>
+            </a:outerShdw>
+          </a:effectLst>
+          <a:scene3d>
+            <a:camera prst="orthographicFront">
+              <a:rot lat="0" lon="0" rev="0"/>
+            </a:camera>
+            <a:lightRig rig="threePt" dir="t">
+              <a:rot lat="0" lon="0" rev="1200000"/>
+            </a:lightRig>
+          </a:scene3d>
+          <a:sp3d>
+            <a:bevelT w="63500" h="25400"/>
+          </a:sp3d>
+        </a:effectStyle>
+      </a:effectStyleLst>
+      <a:bgFillStyleLst>
+        <a:solidFill>
+          <a:schemeClr val="phClr"/>
+        </a:solidFill>
+        <a:gradFill rotWithShape="1">
+          <a:gsLst>
+            <a:gs pos="0">
+              <a:schemeClr val="phClr">
+                <a:tint val="40000"/>
+                <a:satMod val="350000"/>
+              </a:schemeClr>
+            </a:gs>
+            <a:gs pos="40000">
+              <a:schemeClr val="phClr">
+                <a:tint val="45000"/>
+                <a:shade val="99000"/>
+                <a:satMod val="350000"/>
+              </a:schemeClr>
+            </a:gs>
+            <a:gs pos="100000">
+              <a:schemeClr val="phClr">
+                <a:shade val="20000"/>
+                <a:satMod val="255000"/>
+              </a:schemeClr>
+            </a:gs>
+          </a:gsLst>
+          <a:path path="circle">
+            <a:fillToRect l="50000" t="-80000" r="50000" b="180000"/>
+          </a:path>
+        </a:gradFill>
+        <a:gradFill rotWithShape="1">
+          <a:gsLst>
+            <a:gs pos="0">
+              <a:schemeClr val="phClr">
+                <a:tint val="80000"/>
+                <a:satMod val="300000"/>
+              </a:schemeClr>
+            </a:gs>
+            <a:gs pos="100000">
+              <a:schemeClr val="phClr">
+                <a:shade val="30000"/>
+                <a:satMod val="200000"/>
+              </a:schemeClr>
+            </a:gs>
+          </a:gsLst>
+          <a:path path="circle">
+            <a:fillToRect l="50000" t="50000" r="50000" b="50000"/>
+          </a:path>
+        </a:gradFill>
+      </a:bgFillStyleLst>
+    </a:fmtScheme>
+  </a:themeElements>
+  <a:objectDefaults/>
+  <a:extraClrSchemeLst/>
+</a:theme>
 </file>
</xml_diff>

<commit_message>
spelling mistake correction and second subtitle
</commit_message>
<xml_diff>
--- a/samples/pptx/sample.pptx
+++ b/samples/pptx/sample.pptx
@@ -4306,7 +4306,7 @@
     </a:clrScheme>
     <a:fontScheme name="Office">
       <a:majorFont>
-        <a:latin typeface="Calibri"/>
+        <a:latin typeface="Arvo"/>
         <a:ea typeface=""/>
         <a:cs typeface=""/>
         <a:font script="Jpan" typeface="ＭＳ Ｐゴシック"/>
@@ -4340,7 +4340,7 @@
         <a:font script="Uigh" typeface="Microsoft Uighur"/>
       </a:majorFont>
       <a:minorFont>
-        <a:latin typeface="Calibri"/>
+        <a:latin typeface="WorkSans"/>
         <a:ea typeface=""/>
         <a:cs typeface=""/>
         <a:font script="Jpan" typeface="ＭＳ Ｐゴシック"/>

</xml_diff>